<commit_message>
PPT: Speaker notes added for intro. Docx. Minor edits
</commit_message>
<xml_diff>
--- a/report/project_presentation.pptx
+++ b/report/project_presentation.pptx
@@ -4,14 +4,19 @@
   <p:sldMasterIdLst>
     <p:sldMasterId id="2147483686" r:id="rId1"/>
   </p:sldMasterIdLst>
+  <p:notesMasterIdLst>
+    <p:notesMasterId r:id="rId11"/>
+  </p:notesMasterIdLst>
   <p:sldIdLst>
     <p:sldId id="256" r:id="rId2"/>
-    <p:sldId id="257" r:id="rId3"/>
-    <p:sldId id="258" r:id="rId4"/>
-    <p:sldId id="259" r:id="rId5"/>
-    <p:sldId id="260" r:id="rId6"/>
-    <p:sldId id="261" r:id="rId7"/>
-    <p:sldId id="262" r:id="rId8"/>
+    <p:sldId id="263" r:id="rId3"/>
+    <p:sldId id="257" r:id="rId4"/>
+    <p:sldId id="258" r:id="rId5"/>
+    <p:sldId id="259" r:id="rId6"/>
+    <p:sldId id="260" r:id="rId7"/>
+    <p:sldId id="261" r:id="rId8"/>
+    <p:sldId id="262" r:id="rId9"/>
+    <p:sldId id="264" r:id="rId10"/>
   </p:sldIdLst>
   <p:sldSz cx="12192000" cy="6858000"/>
   <p:notesSz cx="6858000" cy="9144000"/>
@@ -110,7 +115,788 @@
       </a:defRPr>
     </a:lvl9pPr>
   </p:defaultTextStyle>
+  <p:extLst>
+    <p:ext uri="{EFAFB233-063F-42B5-8137-9DF3F51BA10A}">
+      <p15:sldGuideLst xmlns:p15="http://schemas.microsoft.com/office/powerpoint/2012/main"/>
+    </p:ext>
+  </p:extLst>
 </p:presentation>
+</file>
+
+<file path=ppt/notesMasters/notesMaster1.xml><?xml version="1.0" encoding="utf-8"?>
+<p:notesMaster xmlns:a="http://schemas.openxmlformats.org/drawingml/2006/main" xmlns:r="http://schemas.openxmlformats.org/officeDocument/2006/relationships" xmlns:p="http://schemas.openxmlformats.org/presentationml/2006/main">
+  <p:cSld>
+    <p:bg>
+      <p:bgRef idx="1001">
+        <a:schemeClr val="bg1"/>
+      </p:bgRef>
+    </p:bg>
+    <p:spTree>
+      <p:nvGrpSpPr>
+        <p:cNvPr id="1" name=""/>
+        <p:cNvGrpSpPr/>
+        <p:nvPr/>
+      </p:nvGrpSpPr>
+      <p:grpSpPr>
+        <a:xfrm>
+          <a:off x="0" y="0"/>
+          <a:ext cx="0" cy="0"/>
+          <a:chOff x="0" y="0"/>
+          <a:chExt cx="0" cy="0"/>
+        </a:xfrm>
+      </p:grpSpPr>
+      <p:sp>
+        <p:nvSpPr>
+          <p:cNvPr id="2" name="Header Placeholder 1"/>
+          <p:cNvSpPr>
+            <a:spLocks noGrp="1"/>
+          </p:cNvSpPr>
+          <p:nvPr>
+            <p:ph type="hdr" sz="quarter"/>
+          </p:nvPr>
+        </p:nvSpPr>
+        <p:spPr>
+          <a:xfrm>
+            <a:off x="0" y="0"/>
+            <a:ext cx="2971800" cy="458788"/>
+          </a:xfrm>
+          <a:prstGeom prst="rect">
+            <a:avLst/>
+          </a:prstGeom>
+        </p:spPr>
+        <p:txBody>
+          <a:bodyPr vert="horz" lIns="91440" tIns="45720" rIns="91440" bIns="45720" rtlCol="0"/>
+          <a:lstStyle>
+            <a:lvl1pPr algn="l">
+              <a:defRPr sz="1200"/>
+            </a:lvl1pPr>
+          </a:lstStyle>
+          <a:p>
+            <a:endParaRPr lang="en-US"/>
+          </a:p>
+        </p:txBody>
+      </p:sp>
+      <p:sp>
+        <p:nvSpPr>
+          <p:cNvPr id="3" name="Date Placeholder 2"/>
+          <p:cNvSpPr>
+            <a:spLocks noGrp="1"/>
+          </p:cNvSpPr>
+          <p:nvPr>
+            <p:ph type="dt" idx="1"/>
+          </p:nvPr>
+        </p:nvSpPr>
+        <p:spPr>
+          <a:xfrm>
+            <a:off x="3884613" y="0"/>
+            <a:ext cx="2971800" cy="458788"/>
+          </a:xfrm>
+          <a:prstGeom prst="rect">
+            <a:avLst/>
+          </a:prstGeom>
+        </p:spPr>
+        <p:txBody>
+          <a:bodyPr vert="horz" lIns="91440" tIns="45720" rIns="91440" bIns="45720" rtlCol="0"/>
+          <a:lstStyle>
+            <a:lvl1pPr algn="r">
+              <a:defRPr sz="1200"/>
+            </a:lvl1pPr>
+          </a:lstStyle>
+          <a:p>
+            <a:fld id="{BFED8B4C-F872-BB40-941E-1DCEAAB37286}" type="datetimeFigureOut">
+              <a:rPr lang="en-US" smtClean="0"/>
+              <a:t>11/26/23</a:t>
+            </a:fld>
+            <a:endParaRPr lang="en-US"/>
+          </a:p>
+        </p:txBody>
+      </p:sp>
+      <p:sp>
+        <p:nvSpPr>
+          <p:cNvPr id="4" name="Slide Image Placeholder 3"/>
+          <p:cNvSpPr>
+            <a:spLocks noGrp="1" noRot="1" noChangeAspect="1"/>
+          </p:cNvSpPr>
+          <p:nvPr>
+            <p:ph type="sldImg" idx="2"/>
+          </p:nvPr>
+        </p:nvSpPr>
+        <p:spPr>
+          <a:xfrm>
+            <a:off x="685800" y="1143000"/>
+            <a:ext cx="5486400" cy="3086100"/>
+          </a:xfrm>
+          <a:prstGeom prst="rect">
+            <a:avLst/>
+          </a:prstGeom>
+          <a:noFill/>
+          <a:ln w="12700">
+            <a:solidFill>
+              <a:prstClr val="black"/>
+            </a:solidFill>
+          </a:ln>
+        </p:spPr>
+        <p:txBody>
+          <a:bodyPr vert="horz" lIns="91440" tIns="45720" rIns="91440" bIns="45720" rtlCol="0" anchor="ctr"/>
+          <a:lstStyle/>
+          <a:p>
+            <a:endParaRPr lang="en-US"/>
+          </a:p>
+        </p:txBody>
+      </p:sp>
+      <p:sp>
+        <p:nvSpPr>
+          <p:cNvPr id="5" name="Notes Placeholder 4"/>
+          <p:cNvSpPr>
+            <a:spLocks noGrp="1"/>
+          </p:cNvSpPr>
+          <p:nvPr>
+            <p:ph type="body" sz="quarter" idx="3"/>
+          </p:nvPr>
+        </p:nvSpPr>
+        <p:spPr>
+          <a:xfrm>
+            <a:off x="685800" y="4400550"/>
+            <a:ext cx="5486400" cy="3600450"/>
+          </a:xfrm>
+          <a:prstGeom prst="rect">
+            <a:avLst/>
+          </a:prstGeom>
+        </p:spPr>
+        <p:txBody>
+          <a:bodyPr vert="horz" lIns="91440" tIns="45720" rIns="91440" bIns="45720" rtlCol="0"/>
+          <a:lstStyle/>
+          <a:p>
+            <a:pPr lvl="0"/>
+            <a:r>
+              <a:rPr lang="en-US"/>
+              <a:t>Click to edit Master text styles</a:t>
+            </a:r>
+          </a:p>
+          <a:p>
+            <a:pPr lvl="1"/>
+            <a:r>
+              <a:rPr lang="en-US"/>
+              <a:t>Second level</a:t>
+            </a:r>
+          </a:p>
+          <a:p>
+            <a:pPr lvl="2"/>
+            <a:r>
+              <a:rPr lang="en-US"/>
+              <a:t>Third level</a:t>
+            </a:r>
+          </a:p>
+          <a:p>
+            <a:pPr lvl="3"/>
+            <a:r>
+              <a:rPr lang="en-US"/>
+              <a:t>Fourth level</a:t>
+            </a:r>
+          </a:p>
+          <a:p>
+            <a:pPr lvl="4"/>
+            <a:r>
+              <a:rPr lang="en-US"/>
+              <a:t>Fifth level</a:t>
+            </a:r>
+          </a:p>
+        </p:txBody>
+      </p:sp>
+      <p:sp>
+        <p:nvSpPr>
+          <p:cNvPr id="6" name="Footer Placeholder 5"/>
+          <p:cNvSpPr>
+            <a:spLocks noGrp="1"/>
+          </p:cNvSpPr>
+          <p:nvPr>
+            <p:ph type="ftr" sz="quarter" idx="4"/>
+          </p:nvPr>
+        </p:nvSpPr>
+        <p:spPr>
+          <a:xfrm>
+            <a:off x="0" y="8685213"/>
+            <a:ext cx="2971800" cy="458787"/>
+          </a:xfrm>
+          <a:prstGeom prst="rect">
+            <a:avLst/>
+          </a:prstGeom>
+        </p:spPr>
+        <p:txBody>
+          <a:bodyPr vert="horz" lIns="91440" tIns="45720" rIns="91440" bIns="45720" rtlCol="0" anchor="b"/>
+          <a:lstStyle>
+            <a:lvl1pPr algn="l">
+              <a:defRPr sz="1200"/>
+            </a:lvl1pPr>
+          </a:lstStyle>
+          <a:p>
+            <a:endParaRPr lang="en-US"/>
+          </a:p>
+        </p:txBody>
+      </p:sp>
+      <p:sp>
+        <p:nvSpPr>
+          <p:cNvPr id="7" name="Slide Number Placeholder 6"/>
+          <p:cNvSpPr>
+            <a:spLocks noGrp="1"/>
+          </p:cNvSpPr>
+          <p:nvPr>
+            <p:ph type="sldNum" sz="quarter" idx="5"/>
+          </p:nvPr>
+        </p:nvSpPr>
+        <p:spPr>
+          <a:xfrm>
+            <a:off x="3884613" y="8685213"/>
+            <a:ext cx="2971800" cy="458787"/>
+          </a:xfrm>
+          <a:prstGeom prst="rect">
+            <a:avLst/>
+          </a:prstGeom>
+        </p:spPr>
+        <p:txBody>
+          <a:bodyPr vert="horz" lIns="91440" tIns="45720" rIns="91440" bIns="45720" rtlCol="0" anchor="b"/>
+          <a:lstStyle>
+            <a:lvl1pPr algn="r">
+              <a:defRPr sz="1200"/>
+            </a:lvl1pPr>
+          </a:lstStyle>
+          <a:p>
+            <a:fld id="{AF049292-9110-EF43-9B06-BC27797FB358}" type="slidenum">
+              <a:rPr lang="en-US" smtClean="0"/>
+              <a:t>‹#›</a:t>
+            </a:fld>
+            <a:endParaRPr lang="en-US"/>
+          </a:p>
+        </p:txBody>
+      </p:sp>
+    </p:spTree>
+    <p:extLst>
+      <p:ext uri="{BB962C8B-B14F-4D97-AF65-F5344CB8AC3E}">
+        <p14:creationId xmlns:p14="http://schemas.microsoft.com/office/powerpoint/2010/main" val="1152982219"/>
+      </p:ext>
+    </p:extLst>
+  </p:cSld>
+  <p:clrMap bg1="lt1" tx1="dk1" bg2="lt2" tx2="dk2" accent1="accent1" accent2="accent2" accent3="accent3" accent4="accent4" accent5="accent5" accent6="accent6" hlink="hlink" folHlink="folHlink"/>
+  <p:notesStyle>
+    <a:lvl1pPr marL="0" algn="l" defTabSz="914400" rtl="0" eaLnBrk="1" latinLnBrk="0" hangingPunct="1">
+      <a:defRPr sz="1200" kern="1200">
+        <a:solidFill>
+          <a:schemeClr val="tx1"/>
+        </a:solidFill>
+        <a:latin typeface="+mn-lt"/>
+        <a:ea typeface="+mn-ea"/>
+        <a:cs typeface="+mn-cs"/>
+      </a:defRPr>
+    </a:lvl1pPr>
+    <a:lvl2pPr marL="457200" algn="l" defTabSz="914400" rtl="0" eaLnBrk="1" latinLnBrk="0" hangingPunct="1">
+      <a:defRPr sz="1200" kern="1200">
+        <a:solidFill>
+          <a:schemeClr val="tx1"/>
+        </a:solidFill>
+        <a:latin typeface="+mn-lt"/>
+        <a:ea typeface="+mn-ea"/>
+        <a:cs typeface="+mn-cs"/>
+      </a:defRPr>
+    </a:lvl2pPr>
+    <a:lvl3pPr marL="914400" algn="l" defTabSz="914400" rtl="0" eaLnBrk="1" latinLnBrk="0" hangingPunct="1">
+      <a:defRPr sz="1200" kern="1200">
+        <a:solidFill>
+          <a:schemeClr val="tx1"/>
+        </a:solidFill>
+        <a:latin typeface="+mn-lt"/>
+        <a:ea typeface="+mn-ea"/>
+        <a:cs typeface="+mn-cs"/>
+      </a:defRPr>
+    </a:lvl3pPr>
+    <a:lvl4pPr marL="1371600" algn="l" defTabSz="914400" rtl="0" eaLnBrk="1" latinLnBrk="0" hangingPunct="1">
+      <a:defRPr sz="1200" kern="1200">
+        <a:solidFill>
+          <a:schemeClr val="tx1"/>
+        </a:solidFill>
+        <a:latin typeface="+mn-lt"/>
+        <a:ea typeface="+mn-ea"/>
+        <a:cs typeface="+mn-cs"/>
+      </a:defRPr>
+    </a:lvl4pPr>
+    <a:lvl5pPr marL="1828800" algn="l" defTabSz="914400" rtl="0" eaLnBrk="1" latinLnBrk="0" hangingPunct="1">
+      <a:defRPr sz="1200" kern="1200">
+        <a:solidFill>
+          <a:schemeClr val="tx1"/>
+        </a:solidFill>
+        <a:latin typeface="+mn-lt"/>
+        <a:ea typeface="+mn-ea"/>
+        <a:cs typeface="+mn-cs"/>
+      </a:defRPr>
+    </a:lvl5pPr>
+    <a:lvl6pPr marL="2286000" algn="l" defTabSz="914400" rtl="0" eaLnBrk="1" latinLnBrk="0" hangingPunct="1">
+      <a:defRPr sz="1200" kern="1200">
+        <a:solidFill>
+          <a:schemeClr val="tx1"/>
+        </a:solidFill>
+        <a:latin typeface="+mn-lt"/>
+        <a:ea typeface="+mn-ea"/>
+        <a:cs typeface="+mn-cs"/>
+      </a:defRPr>
+    </a:lvl6pPr>
+    <a:lvl7pPr marL="2743200" algn="l" defTabSz="914400" rtl="0" eaLnBrk="1" latinLnBrk="0" hangingPunct="1">
+      <a:defRPr sz="1200" kern="1200">
+        <a:solidFill>
+          <a:schemeClr val="tx1"/>
+        </a:solidFill>
+        <a:latin typeface="+mn-lt"/>
+        <a:ea typeface="+mn-ea"/>
+        <a:cs typeface="+mn-cs"/>
+      </a:defRPr>
+    </a:lvl7pPr>
+    <a:lvl8pPr marL="3200400" algn="l" defTabSz="914400" rtl="0" eaLnBrk="1" latinLnBrk="0" hangingPunct="1">
+      <a:defRPr sz="1200" kern="1200">
+        <a:solidFill>
+          <a:schemeClr val="tx1"/>
+        </a:solidFill>
+        <a:latin typeface="+mn-lt"/>
+        <a:ea typeface="+mn-ea"/>
+        <a:cs typeface="+mn-cs"/>
+      </a:defRPr>
+    </a:lvl8pPr>
+    <a:lvl9pPr marL="3657600" algn="l" defTabSz="914400" rtl="0" eaLnBrk="1" latinLnBrk="0" hangingPunct="1">
+      <a:defRPr sz="1200" kern="1200">
+        <a:solidFill>
+          <a:schemeClr val="tx1"/>
+        </a:solidFill>
+        <a:latin typeface="+mn-lt"/>
+        <a:ea typeface="+mn-ea"/>
+        <a:cs typeface="+mn-cs"/>
+      </a:defRPr>
+    </a:lvl9pPr>
+  </p:notesStyle>
+</p:notesMaster>
+</file>
+
+<file path=ppt/notesSlides/notesSlide1.xml><?xml version="1.0" encoding="utf-8"?>
+<p:notes xmlns:a="http://schemas.openxmlformats.org/drawingml/2006/main" xmlns:r="http://schemas.openxmlformats.org/officeDocument/2006/relationships" xmlns:p="http://schemas.openxmlformats.org/presentationml/2006/main">
+  <p:cSld>
+    <p:spTree>
+      <p:nvGrpSpPr>
+        <p:cNvPr id="1" name=""/>
+        <p:cNvGrpSpPr/>
+        <p:nvPr/>
+      </p:nvGrpSpPr>
+      <p:grpSpPr>
+        <a:xfrm>
+          <a:off x="0" y="0"/>
+          <a:ext cx="0" cy="0"/>
+          <a:chOff x="0" y="0"/>
+          <a:chExt cx="0" cy="0"/>
+        </a:xfrm>
+      </p:grpSpPr>
+      <p:sp>
+        <p:nvSpPr>
+          <p:cNvPr id="2" name="Slide Image Placeholder 1"/>
+          <p:cNvSpPr>
+            <a:spLocks noGrp="1" noRot="1" noChangeAspect="1"/>
+          </p:cNvSpPr>
+          <p:nvPr>
+            <p:ph type="sldImg"/>
+          </p:nvPr>
+        </p:nvSpPr>
+        <p:spPr/>
+      </p:sp>
+      <p:sp>
+        <p:nvSpPr>
+          <p:cNvPr id="3" name="Notes Placeholder 2"/>
+          <p:cNvSpPr>
+            <a:spLocks noGrp="1"/>
+          </p:cNvSpPr>
+          <p:nvPr>
+            <p:ph type="body" idx="1"/>
+          </p:nvPr>
+        </p:nvSpPr>
+        <p:spPr/>
+        <p:txBody>
+          <a:bodyPr/>
+          <a:lstStyle/>
+          <a:p>
+            <a:endParaRPr lang="en-US" dirty="0"/>
+          </a:p>
+          <a:p>
+            <a:pPr marL="0" marR="0" lvl="0" indent="0" algn="l" defTabSz="914400" rtl="0" eaLnBrk="1" fontAlgn="auto" latinLnBrk="0" hangingPunct="1">
+              <a:lnSpc>
+                <a:spcPct val="100000"/>
+              </a:lnSpc>
+              <a:spcBef>
+                <a:spcPts val="0"/>
+              </a:spcBef>
+              <a:spcAft>
+                <a:spcPts val="0"/>
+              </a:spcAft>
+              <a:buClrTx/>
+              <a:buSzTx/>
+              <a:buFontTx/>
+              <a:buNone/>
+              <a:tabLst/>
+              <a:defRPr/>
+            </a:pPr>
+            <a:r>
+              <a:rPr lang="en-US" u="sng" dirty="0"/>
+              <a:t>Introduce the Malware issue</a:t>
+            </a:r>
+            <a:endParaRPr lang="en-US" dirty="0"/>
+          </a:p>
+          <a:p>
+            <a:r>
+              <a:rPr lang="en-US" dirty="0"/>
+              <a:t>The Android operating system has become a popular choice for smartphone users worldwide. It currently has a global market share of 72% in the mobile operating systems market. However, the rapid growth of Android apps and its worldwide popularity in the smartphone market as well as it’s open-source nature has made it an easy and accessible target for malware. </a:t>
+            </a:r>
+          </a:p>
+          <a:p>
+            <a:endParaRPr lang="en-US" dirty="0"/>
+          </a:p>
+          <a:p>
+            <a:r>
+              <a:rPr lang="en-US" dirty="0"/>
+              <a:t>Although Android attempts to curb the harm of malicious software with updates to fix vulnerabilities, like they do with Play Protect in the Google Play Appstore, unfortunately, malware apps have also upgraded and adapted to this evolution. </a:t>
+            </a:r>
+          </a:p>
+          <a:p>
+            <a:endParaRPr lang="en-US" dirty="0"/>
+          </a:p>
+          <a:p>
+            <a:r>
+              <a:rPr lang="en-US" dirty="0"/>
+              <a:t>For those of us unfamiliar with the concept, malware is a type of software that is designed to harm or exploit any device it infects. It can be used to steal personal information, damage files or even take control of a device. The ever-increasing number of native AOS permissions and developers’ ability to create custom permissions provide plenty of options to gain control over devices and private data. Therefore newly created permissions could be of great importance in detecting current malware. </a:t>
+            </a:r>
+          </a:p>
+          <a:p>
+            <a:endParaRPr lang="en-US" dirty="0"/>
+          </a:p>
+        </p:txBody>
+      </p:sp>
+      <p:sp>
+        <p:nvSpPr>
+          <p:cNvPr id="4" name="Slide Number Placeholder 3"/>
+          <p:cNvSpPr>
+            <a:spLocks noGrp="1"/>
+          </p:cNvSpPr>
+          <p:nvPr>
+            <p:ph type="sldNum" sz="quarter" idx="5"/>
+          </p:nvPr>
+        </p:nvSpPr>
+        <p:spPr/>
+        <p:txBody>
+          <a:bodyPr/>
+          <a:lstStyle/>
+          <a:p>
+            <a:fld id="{AF049292-9110-EF43-9B06-BC27797FB358}" type="slidenum">
+              <a:rPr lang="en-US" smtClean="0"/>
+              <a:t>2</a:t>
+            </a:fld>
+            <a:endParaRPr lang="en-US"/>
+          </a:p>
+        </p:txBody>
+      </p:sp>
+    </p:spTree>
+    <p:extLst>
+      <p:ext uri="{BB962C8B-B14F-4D97-AF65-F5344CB8AC3E}">
+        <p14:creationId xmlns:p14="http://schemas.microsoft.com/office/powerpoint/2010/main" val="268272540"/>
+      </p:ext>
+    </p:extLst>
+  </p:cSld>
+  <p:clrMapOvr>
+    <a:masterClrMapping/>
+  </p:clrMapOvr>
+</p:notes>
+</file>
+
+<file path=ppt/notesSlides/notesSlide2.xml><?xml version="1.0" encoding="utf-8"?>
+<p:notes xmlns:a="http://schemas.openxmlformats.org/drawingml/2006/main" xmlns:r="http://schemas.openxmlformats.org/officeDocument/2006/relationships" xmlns:p="http://schemas.openxmlformats.org/presentationml/2006/main">
+  <p:cSld>
+    <p:spTree>
+      <p:nvGrpSpPr>
+        <p:cNvPr id="1" name=""/>
+        <p:cNvGrpSpPr/>
+        <p:nvPr/>
+      </p:nvGrpSpPr>
+      <p:grpSpPr>
+        <a:xfrm>
+          <a:off x="0" y="0"/>
+          <a:ext cx="0" cy="0"/>
+          <a:chOff x="0" y="0"/>
+          <a:chExt cx="0" cy="0"/>
+        </a:xfrm>
+      </p:grpSpPr>
+      <p:sp>
+        <p:nvSpPr>
+          <p:cNvPr id="2" name="Slide Image Placeholder 1"/>
+          <p:cNvSpPr>
+            <a:spLocks noGrp="1" noRot="1" noChangeAspect="1"/>
+          </p:cNvSpPr>
+          <p:nvPr>
+            <p:ph type="sldImg"/>
+          </p:nvPr>
+        </p:nvSpPr>
+        <p:spPr/>
+      </p:sp>
+      <p:sp>
+        <p:nvSpPr>
+          <p:cNvPr id="3" name="Notes Placeholder 2"/>
+          <p:cNvSpPr>
+            <a:spLocks noGrp="1"/>
+          </p:cNvSpPr>
+          <p:nvPr>
+            <p:ph type="body" idx="1"/>
+          </p:nvPr>
+        </p:nvSpPr>
+        <p:spPr/>
+        <p:txBody>
+          <a:bodyPr/>
+          <a:lstStyle/>
+          <a:p>
+            <a:pPr marL="0" marR="0" lvl="0" indent="0" algn="l" defTabSz="914400" rtl="0" eaLnBrk="1" fontAlgn="auto" latinLnBrk="0" hangingPunct="1">
+              <a:lnSpc>
+                <a:spcPct val="100000"/>
+              </a:lnSpc>
+              <a:spcBef>
+                <a:spcPts val="0"/>
+              </a:spcBef>
+              <a:spcAft>
+                <a:spcPts val="0"/>
+              </a:spcAft>
+              <a:buClrTx/>
+              <a:buSzTx/>
+              <a:buFontTx/>
+              <a:buNone/>
+              <a:tabLst/>
+              <a:defRPr/>
+            </a:pPr>
+            <a:r>
+              <a:rPr lang="en-US" u="sng" dirty="0"/>
+              <a:t>Discuss the article we will be referencing</a:t>
+            </a:r>
+          </a:p>
+          <a:p>
+            <a:r>
+              <a:rPr lang="en-US" dirty="0"/>
+              <a:t>Our project was inspired by a paper from the Journal of information Security and Applications which tackles this very issue. The researchers of this article have proposed a novel malware detection framework for Android called </a:t>
+            </a:r>
+            <a:r>
+              <a:rPr lang="en-US" dirty="0" err="1"/>
+              <a:t>NATICUSdroid</a:t>
+            </a:r>
+            <a:r>
+              <a:rPr lang="en-US" dirty="0"/>
+              <a:t>. </a:t>
+            </a:r>
+            <a:r>
+              <a:rPr lang="en-US" dirty="0" err="1"/>
+              <a:t>NATICUSdroid</a:t>
+            </a:r>
+            <a:r>
+              <a:rPr lang="en-US" dirty="0"/>
+              <a:t> investigates and classifies benign and malware using statistically selected native and custom Android permissions as features for various machine learning classifiers. </a:t>
+            </a:r>
+          </a:p>
+          <a:p>
+            <a:endParaRPr lang="en-US" dirty="0"/>
+          </a:p>
+          <a:p>
+            <a:r>
+              <a:rPr lang="en-US" u="sng" dirty="0"/>
+              <a:t>Our objective</a:t>
+            </a:r>
+            <a:endParaRPr lang="en-US" u="none" dirty="0"/>
+          </a:p>
+          <a:p>
+            <a:r>
+              <a:rPr lang="en-US" u="none" dirty="0"/>
+              <a:t>Our objective was first to replicate the performance of some of their machine learning methods before attempting to improve upon them with some of our own ideas. We see that Random Forest had done the best with a validation accuracy of 97%. Aside from the models here we will also fit a neural network to see if we can get a better performance. </a:t>
+            </a:r>
+            <a:endParaRPr lang="en-US" u="sng" dirty="0"/>
+          </a:p>
+          <a:p>
+            <a:endParaRPr lang="en-US" dirty="0"/>
+          </a:p>
+        </p:txBody>
+      </p:sp>
+      <p:sp>
+        <p:nvSpPr>
+          <p:cNvPr id="4" name="Slide Number Placeholder 3"/>
+          <p:cNvSpPr>
+            <a:spLocks noGrp="1"/>
+          </p:cNvSpPr>
+          <p:nvPr>
+            <p:ph type="sldNum" sz="quarter" idx="5"/>
+          </p:nvPr>
+        </p:nvSpPr>
+        <p:spPr/>
+        <p:txBody>
+          <a:bodyPr/>
+          <a:lstStyle/>
+          <a:p>
+            <a:fld id="{AF049292-9110-EF43-9B06-BC27797FB358}" type="slidenum">
+              <a:rPr lang="en-US" smtClean="0"/>
+              <a:t>3</a:t>
+            </a:fld>
+            <a:endParaRPr lang="en-US"/>
+          </a:p>
+        </p:txBody>
+      </p:sp>
+    </p:spTree>
+    <p:extLst>
+      <p:ext uri="{BB962C8B-B14F-4D97-AF65-F5344CB8AC3E}">
+        <p14:creationId xmlns:p14="http://schemas.microsoft.com/office/powerpoint/2010/main" val="322801201"/>
+      </p:ext>
+    </p:extLst>
+  </p:cSld>
+  <p:clrMapOvr>
+    <a:masterClrMapping/>
+  </p:clrMapOvr>
+</p:notes>
+</file>
+
+<file path=ppt/notesSlides/notesSlide3.xml><?xml version="1.0" encoding="utf-8"?>
+<p:notes xmlns:a="http://schemas.openxmlformats.org/drawingml/2006/main" xmlns:r="http://schemas.openxmlformats.org/officeDocument/2006/relationships" xmlns:p="http://schemas.openxmlformats.org/presentationml/2006/main">
+  <p:cSld>
+    <p:spTree>
+      <p:nvGrpSpPr>
+        <p:cNvPr id="1" name=""/>
+        <p:cNvGrpSpPr/>
+        <p:nvPr/>
+      </p:nvGrpSpPr>
+      <p:grpSpPr>
+        <a:xfrm>
+          <a:off x="0" y="0"/>
+          <a:ext cx="0" cy="0"/>
+          <a:chOff x="0" y="0"/>
+          <a:chExt cx="0" cy="0"/>
+        </a:xfrm>
+      </p:grpSpPr>
+      <p:sp>
+        <p:nvSpPr>
+          <p:cNvPr id="2" name="Slide Image Placeholder 1"/>
+          <p:cNvSpPr>
+            <a:spLocks noGrp="1" noRot="1" noChangeAspect="1"/>
+          </p:cNvSpPr>
+          <p:nvPr>
+            <p:ph type="sldImg"/>
+          </p:nvPr>
+        </p:nvSpPr>
+        <p:spPr/>
+      </p:sp>
+      <p:sp>
+        <p:nvSpPr>
+          <p:cNvPr id="3" name="Notes Placeholder 2"/>
+          <p:cNvSpPr>
+            <a:spLocks noGrp="1"/>
+          </p:cNvSpPr>
+          <p:nvPr>
+            <p:ph type="body" idx="1"/>
+          </p:nvPr>
+        </p:nvSpPr>
+        <p:spPr/>
+        <p:txBody>
+          <a:bodyPr/>
+          <a:lstStyle/>
+          <a:p>
+            <a:pPr marL="0" marR="0" lvl="0" indent="0" algn="l" defTabSz="914400" rtl="0" eaLnBrk="1" fontAlgn="auto" latinLnBrk="0" hangingPunct="1">
+              <a:lnSpc>
+                <a:spcPct val="100000"/>
+              </a:lnSpc>
+              <a:spcBef>
+                <a:spcPts val="0"/>
+              </a:spcBef>
+              <a:spcAft>
+                <a:spcPts val="0"/>
+              </a:spcAft>
+              <a:buClrTx/>
+              <a:buSzTx/>
+              <a:buFontTx/>
+              <a:buNone/>
+              <a:tabLst/>
+              <a:defRPr/>
+            </a:pPr>
+            <a:r>
+              <a:rPr lang="en-US" u="sng" dirty="0"/>
+              <a:t>Discuss the dataset</a:t>
+            </a:r>
+            <a:endParaRPr lang="en-US" dirty="0"/>
+          </a:p>
+          <a:p>
+            <a:r>
+              <a:rPr lang="en-US" dirty="0"/>
+              <a:t>86 permissions were analyzed in roughly 30,000 benign and malware collected during 2010-2019 to identify the most significant permissions. </a:t>
+            </a:r>
+          </a:p>
+          <a:p>
+            <a:r>
+              <a:rPr lang="en-US" dirty="0"/>
+              <a:t>The data has two main sources. Benign apps which were taken from the </a:t>
+            </a:r>
+            <a:r>
+              <a:rPr lang="en-US" dirty="0" err="1"/>
+              <a:t>Androzoo</a:t>
+            </a:r>
+            <a:r>
+              <a:rPr lang="en-US" dirty="0"/>
+              <a:t> database. Although a few sources like Google Play Store have been known to contain malware, for simplicity, an assumption was made that the apps from these sources exhibit non-malicious behavior. To add additional assurance, the 15,000 apps chosen were rated ‘benign’ by an antivirus software and further pruned using a threshold of a specific API protection level. </a:t>
+            </a:r>
+          </a:p>
+          <a:p>
+            <a:endParaRPr lang="en-US" dirty="0"/>
+          </a:p>
+          <a:p>
+            <a:r>
+              <a:rPr lang="en-US" dirty="0"/>
+              <a:t>The malware dataset was taken from Argus Lab’s Android Malware Database, of which a roughly similar random sample size was taken.</a:t>
+            </a:r>
+          </a:p>
+          <a:p>
+            <a:endParaRPr lang="en-US" dirty="0"/>
+          </a:p>
+          <a:p>
+            <a:r>
+              <a:rPr lang="en-US" dirty="0"/>
+              <a:t>We’ll notice some overlap in the permissions being used for both benign and malicious apps so we can guess that they may not be included in the final features after we fit our models. The table just gives an idea of the most frequently used permissions in the apps. </a:t>
+            </a:r>
+          </a:p>
+          <a:p>
+            <a:endParaRPr lang="en-US" dirty="0"/>
+          </a:p>
+        </p:txBody>
+      </p:sp>
+      <p:sp>
+        <p:nvSpPr>
+          <p:cNvPr id="4" name="Slide Number Placeholder 3"/>
+          <p:cNvSpPr>
+            <a:spLocks noGrp="1"/>
+          </p:cNvSpPr>
+          <p:nvPr>
+            <p:ph type="sldNum" sz="quarter" idx="5"/>
+          </p:nvPr>
+        </p:nvSpPr>
+        <p:spPr/>
+        <p:txBody>
+          <a:bodyPr/>
+          <a:lstStyle/>
+          <a:p>
+            <a:fld id="{AF049292-9110-EF43-9B06-BC27797FB358}" type="slidenum">
+              <a:rPr lang="en-US" smtClean="0"/>
+              <a:t>4</a:t>
+            </a:fld>
+            <a:endParaRPr lang="en-US"/>
+          </a:p>
+        </p:txBody>
+      </p:sp>
+    </p:spTree>
+    <p:extLst>
+      <p:ext uri="{BB962C8B-B14F-4D97-AF65-F5344CB8AC3E}">
+        <p14:creationId xmlns:p14="http://schemas.microsoft.com/office/powerpoint/2010/main" val="2020589855"/>
+      </p:ext>
+    </p:extLst>
+  </p:cSld>
+  <p:clrMapOvr>
+    <a:masterClrMapping/>
+  </p:clrMapOvr>
+</p:notes>
 </file>
 
 <file path=ppt/slideLayouts/slideLayout1.xml><?xml version="1.0" encoding="utf-8"?>
@@ -275,7 +1061,7 @@
           <a:p>
             <a:fld id="{E6171E64-FE02-4DE5-B72F-53C3706641C3}" type="datetimeFigureOut">
               <a:rPr lang="en-US" smtClean="0"/>
-              <a:t>11/25/23</a:t>
+              <a:t>11/26/23</a:t>
             </a:fld>
             <a:endParaRPr lang="en-US"/>
           </a:p>
@@ -662,7 +1448,7 @@
           <a:p>
             <a:fld id="{E6171E64-FE02-4DE5-B72F-53C3706641C3}" type="datetimeFigureOut">
               <a:rPr lang="en-US" smtClean="0"/>
-              <a:t>11/25/23</a:t>
+              <a:t>11/26/23</a:t>
             </a:fld>
             <a:endParaRPr lang="en-US"/>
           </a:p>
@@ -1055,7 +1841,7 @@
           <a:p>
             <a:fld id="{E6171E64-FE02-4DE5-B72F-53C3706641C3}" type="datetimeFigureOut">
               <a:rPr lang="en-US" smtClean="0"/>
-              <a:t>11/25/23</a:t>
+              <a:t>11/26/23</a:t>
             </a:fld>
             <a:endParaRPr lang="en-US"/>
           </a:p>
@@ -1470,7 +2256,7 @@
           <a:p>
             <a:fld id="{E6171E64-FE02-4DE5-B72F-53C3706641C3}" type="datetimeFigureOut">
               <a:rPr lang="en-US" smtClean="0"/>
-              <a:t>11/25/23</a:t>
+              <a:t>11/26/23</a:t>
             </a:fld>
             <a:endParaRPr lang="en-US"/>
           </a:p>
@@ -1812,7 +2598,7 @@
           <a:p>
             <a:fld id="{E6171E64-FE02-4DE5-B72F-53C3706641C3}" type="datetimeFigureOut">
               <a:rPr lang="en-US" smtClean="0"/>
-              <a:t>11/25/23</a:t>
+              <a:t>11/26/23</a:t>
             </a:fld>
             <a:endParaRPr lang="en-US"/>
           </a:p>
@@ -2136,7 +2922,7 @@
           <a:p>
             <a:fld id="{E6171E64-FE02-4DE5-B72F-53C3706641C3}" type="datetimeFigureOut">
               <a:rPr lang="en-US" smtClean="0"/>
-              <a:t>11/25/23</a:t>
+              <a:t>11/26/23</a:t>
             </a:fld>
             <a:endParaRPr lang="en-US"/>
           </a:p>
@@ -2617,7 +3403,7 @@
           <a:p>
             <a:fld id="{E6171E64-FE02-4DE5-B72F-53C3706641C3}" type="datetimeFigureOut">
               <a:rPr lang="en-US" smtClean="0"/>
-              <a:t>11/25/23</a:t>
+              <a:t>11/26/23</a:t>
             </a:fld>
             <a:endParaRPr lang="en-US"/>
           </a:p>
@@ -2779,7 +3565,7 @@
           <a:p>
             <a:fld id="{E6171E64-FE02-4DE5-B72F-53C3706641C3}" type="datetimeFigureOut">
               <a:rPr lang="en-US" smtClean="0"/>
-              <a:t>11/25/23</a:t>
+              <a:t>11/26/23</a:t>
             </a:fld>
             <a:endParaRPr lang="en-US"/>
           </a:p>
@@ -2892,7 +3678,7 @@
           <a:p>
             <a:fld id="{E6171E64-FE02-4DE5-B72F-53C3706641C3}" type="datetimeFigureOut">
               <a:rPr lang="en-US" smtClean="0"/>
-              <a:t>11/25/23</a:t>
+              <a:t>11/26/23</a:t>
             </a:fld>
             <a:endParaRPr lang="en-US"/>
           </a:p>
@@ -3214,7 +4000,7 @@
           <a:p>
             <a:fld id="{E6171E64-FE02-4DE5-B72F-53C3706641C3}" type="datetimeFigureOut">
               <a:rPr lang="en-US" smtClean="0"/>
-              <a:t>11/25/23</a:t>
+              <a:t>11/26/23</a:t>
             </a:fld>
             <a:endParaRPr lang="en-US"/>
           </a:p>
@@ -3516,7 +4302,7 @@
           <a:p>
             <a:fld id="{E6171E64-FE02-4DE5-B72F-53C3706641C3}" type="datetimeFigureOut">
               <a:rPr lang="en-US" smtClean="0"/>
-              <a:t>11/25/23</a:t>
+              <a:t>11/26/23</a:t>
             </a:fld>
             <a:endParaRPr lang="en-US"/>
           </a:p>
@@ -3757,7 +4543,7 @@
           <a:p>
             <a:fld id="{E6171E64-FE02-4DE5-B72F-53C3706641C3}" type="datetimeFigureOut">
               <a:rPr lang="en-US" smtClean="0"/>
-              <a:t>11/25/23</a:t>
+              <a:t>11/26/23</a:t>
             </a:fld>
             <a:endParaRPr lang="en-US"/>
           </a:p>
@@ -4924,7 +5710,7 @@
           <p:cNvPr id="2" name="Title 1">
             <a:extLst>
               <a:ext uri="{FF2B5EF4-FFF2-40B4-BE49-F238E27FC236}">
-                <a16:creationId xmlns:a16="http://schemas.microsoft.com/office/drawing/2014/main" id="{D663F9CA-71F1-DDC8-353E-6579169DDC14}"/>
+                <a16:creationId xmlns:a16="http://schemas.microsoft.com/office/drawing/2014/main" id="{BBC50C80-13C9-A9EC-47FA-327E94B65227}"/>
               </a:ext>
             </a:extLst>
           </p:cNvPr>
@@ -4935,50 +5721,57 @@
             <p:ph type="title"/>
           </p:nvPr>
         </p:nvSpPr>
-        <p:spPr/>
+        <p:spPr>
+          <a:xfrm>
+            <a:off x="808661" y="365125"/>
+            <a:ext cx="10357666" cy="634335"/>
+          </a:xfrm>
+        </p:spPr>
         <p:txBody>
           <a:bodyPr/>
           <a:lstStyle/>
           <a:p>
+            <a:pPr algn="ctr"/>
             <a:r>
               <a:rPr lang="en-US" dirty="0"/>
-              <a:t>Introduction</a:t>
-            </a:r>
-          </a:p>
-        </p:txBody>
-      </p:sp>
-      <p:sp>
-        <p:nvSpPr>
-          <p:cNvPr id="3" name="Content Placeholder 2">
-            <a:extLst>
-              <a:ext uri="{FF2B5EF4-FFF2-40B4-BE49-F238E27FC236}">
-                <a16:creationId xmlns:a16="http://schemas.microsoft.com/office/drawing/2014/main" id="{CF6D84E7-25B7-2BF4-7F07-6557D74F431C}"/>
-              </a:ext>
-            </a:extLst>
-          </p:cNvPr>
-          <p:cNvSpPr>
-            <a:spLocks noGrp="1"/>
-          </p:cNvSpPr>
-          <p:nvPr>
-            <p:ph idx="1"/>
-          </p:nvPr>
-        </p:nvSpPr>
-        <p:spPr/>
-        <p:txBody>
-          <a:bodyPr/>
-          <a:lstStyle/>
-          <a:p>
-            <a:r>
-              <a:rPr lang="en-US" dirty="0"/>
-              <a:t>Talk about the article and the dataset</a:t>
-            </a:r>
-          </a:p>
-        </p:txBody>
-      </p:sp>
+              <a:t>Malware</a:t>
+            </a:r>
+          </a:p>
+        </p:txBody>
+      </p:sp>
+      <p:pic>
+        <p:nvPicPr>
+          <p:cNvPr id="4" name="Picture 3">
+            <a:extLst>
+              <a:ext uri="{FF2B5EF4-FFF2-40B4-BE49-F238E27FC236}">
+                <a16:creationId xmlns:a16="http://schemas.microsoft.com/office/drawing/2014/main" id="{F4688C94-B4D0-4498-5E2B-B16CC95C8798}"/>
+              </a:ext>
+            </a:extLst>
+          </p:cNvPr>
+          <p:cNvPicPr>
+            <a:picLocks noChangeAspect="1"/>
+          </p:cNvPicPr>
+          <p:nvPr/>
+        </p:nvPicPr>
+        <p:blipFill rotWithShape="1">
+          <a:blip r:embed="rId3"/>
+          <a:srcRect b="7450"/>
+          <a:stretch/>
+        </p:blipFill>
+        <p:spPr>
+          <a:xfrm>
+            <a:off x="3064354" y="1564414"/>
+            <a:ext cx="5104829" cy="4049577"/>
+          </a:xfrm>
+          <a:prstGeom prst="rect">
+            <a:avLst/>
+          </a:prstGeom>
+        </p:spPr>
+      </p:pic>
     </p:spTree>
     <p:extLst>
       <p:ext uri="{BB962C8B-B14F-4D97-AF65-F5344CB8AC3E}">
-        <p14:creationId xmlns:p14="http://schemas.microsoft.com/office/powerpoint/2010/main" val="4161649350"/>
+        <p14:creationId xmlns:p14="http://schemas.microsoft.com/office/powerpoint/2010/main" val="411291352"/>
       </p:ext>
     </p:extLst>
   </p:cSld>
@@ -5005,64 +5798,70 @@
           <a:chExt cx="0" cy="0"/>
         </a:xfrm>
       </p:grpSpPr>
-      <p:sp>
-        <p:nvSpPr>
-          <p:cNvPr id="2" name="Title 1">
-            <a:extLst>
-              <a:ext uri="{FF2B5EF4-FFF2-40B4-BE49-F238E27FC236}">
-                <a16:creationId xmlns:a16="http://schemas.microsoft.com/office/drawing/2014/main" id="{BBC50C80-13C9-A9EC-47FA-327E94B65227}"/>
-              </a:ext>
-            </a:extLst>
-          </p:cNvPr>
-          <p:cNvSpPr>
-            <a:spLocks noGrp="1"/>
-          </p:cNvSpPr>
-          <p:nvPr>
-            <p:ph type="title"/>
-          </p:nvPr>
-        </p:nvSpPr>
-        <p:spPr/>
-        <p:txBody>
-          <a:bodyPr/>
-          <a:lstStyle/>
-          <a:p>
-            <a:r>
-              <a:rPr lang="en-US"/>
-              <a:t>Exploring the data</a:t>
-            </a:r>
-            <a:endParaRPr lang="en-US" dirty="0"/>
-          </a:p>
-        </p:txBody>
-      </p:sp>
-      <p:sp>
-        <p:nvSpPr>
-          <p:cNvPr id="3" name="Content Placeholder 2">
-            <a:extLst>
-              <a:ext uri="{FF2B5EF4-FFF2-40B4-BE49-F238E27FC236}">
-                <a16:creationId xmlns:a16="http://schemas.microsoft.com/office/drawing/2014/main" id="{DDA04962-5CB6-D7E4-9493-6C746DD473A8}"/>
-              </a:ext>
-            </a:extLst>
-          </p:cNvPr>
-          <p:cNvSpPr>
-            <a:spLocks noGrp="1"/>
-          </p:cNvSpPr>
-          <p:nvPr>
-            <p:ph idx="1"/>
-          </p:nvPr>
-        </p:nvSpPr>
-        <p:spPr/>
-        <p:txBody>
-          <a:bodyPr/>
-          <a:lstStyle/>
-          <a:p>
-            <a:endParaRPr lang="en-US"/>
-          </a:p>
-        </p:txBody>
-      </p:sp>
+      <p:pic>
+        <p:nvPicPr>
+          <p:cNvPr id="10" name="Picture 9" descr="A close-up of a document&#10;&#10;Description automatically generated">
+            <a:extLst>
+              <a:ext uri="{FF2B5EF4-FFF2-40B4-BE49-F238E27FC236}">
+                <a16:creationId xmlns:a16="http://schemas.microsoft.com/office/drawing/2014/main" id="{99A67774-2B7D-C5B1-9435-FE98DC480EAC}"/>
+              </a:ext>
+            </a:extLst>
+          </p:cNvPr>
+          <p:cNvPicPr>
+            <a:picLocks noChangeAspect="1"/>
+          </p:cNvPicPr>
+          <p:nvPr/>
+        </p:nvPicPr>
+        <p:blipFill>
+          <a:blip r:embed="rId3"/>
+          <a:stretch>
+            <a:fillRect/>
+          </a:stretch>
+        </p:blipFill>
+        <p:spPr>
+          <a:xfrm>
+            <a:off x="1737431" y="217650"/>
+            <a:ext cx="7772400" cy="2991270"/>
+          </a:xfrm>
+          <a:prstGeom prst="rect">
+            <a:avLst/>
+          </a:prstGeom>
+        </p:spPr>
+      </p:pic>
+      <p:pic>
+        <p:nvPicPr>
+          <p:cNvPr id="19" name="Picture 18" descr="A table with numbers and symbols&#10;&#10;Description automatically generated">
+            <a:extLst>
+              <a:ext uri="{FF2B5EF4-FFF2-40B4-BE49-F238E27FC236}">
+                <a16:creationId xmlns:a16="http://schemas.microsoft.com/office/drawing/2014/main" id="{3D670857-8684-F74D-7CA6-F89E00988926}"/>
+              </a:ext>
+            </a:extLst>
+          </p:cNvPr>
+          <p:cNvPicPr>
+            <a:picLocks noChangeAspect="1"/>
+          </p:cNvPicPr>
+          <p:nvPr/>
+        </p:nvPicPr>
+        <p:blipFill>
+          <a:blip r:embed="rId4"/>
+          <a:stretch>
+            <a:fillRect/>
+          </a:stretch>
+        </p:blipFill>
+        <p:spPr>
+          <a:xfrm>
+            <a:off x="1737431" y="3429000"/>
+            <a:ext cx="7772400" cy="2701956"/>
+          </a:xfrm>
+          <a:prstGeom prst="rect">
+            <a:avLst/>
+          </a:prstGeom>
+        </p:spPr>
+      </p:pic>
     </p:spTree>
     <p:extLst>
       <p:ext uri="{BB962C8B-B14F-4D97-AF65-F5344CB8AC3E}">
-        <p14:creationId xmlns:p14="http://schemas.microsoft.com/office/powerpoint/2010/main" val="2061080694"/>
+        <p14:creationId xmlns:p14="http://schemas.microsoft.com/office/powerpoint/2010/main" val="4161649350"/>
       </p:ext>
     </p:extLst>
   </p:cSld>
@@ -5094,7 +5893,7 @@
           <p:cNvPr id="2" name="Title 1">
             <a:extLst>
               <a:ext uri="{FF2B5EF4-FFF2-40B4-BE49-F238E27FC236}">
-                <a16:creationId xmlns:a16="http://schemas.microsoft.com/office/drawing/2014/main" id="{0F6CE28D-D77F-885B-91A5-7302FAE378C4}"/>
+                <a16:creationId xmlns:a16="http://schemas.microsoft.com/office/drawing/2014/main" id="{BBC50C80-13C9-A9EC-47FA-327E94B65227}"/>
               </a:ext>
             </a:extLst>
           </p:cNvPr>
@@ -5105,47 +5904,107 @@
             <p:ph type="title"/>
           </p:nvPr>
         </p:nvSpPr>
-        <p:spPr/>
+        <p:spPr>
+          <a:xfrm>
+            <a:off x="2738878" y="0"/>
+            <a:ext cx="6714243" cy="1080561"/>
+          </a:xfrm>
+        </p:spPr>
         <p:txBody>
           <a:bodyPr/>
           <a:lstStyle/>
           <a:p>
             <a:r>
-              <a:rPr lang="en-US" dirty="0"/>
-              <a:t>Methodology</a:t>
-            </a:r>
-          </a:p>
-        </p:txBody>
-      </p:sp>
-      <p:sp>
-        <p:nvSpPr>
-          <p:cNvPr id="3" name="Content Placeholder 2">
-            <a:extLst>
-              <a:ext uri="{FF2B5EF4-FFF2-40B4-BE49-F238E27FC236}">
-                <a16:creationId xmlns:a16="http://schemas.microsoft.com/office/drawing/2014/main" id="{88C63423-5311-72BE-AC08-8DDEB193F258}"/>
-              </a:ext>
-            </a:extLst>
-          </p:cNvPr>
-          <p:cNvSpPr>
-            <a:spLocks noGrp="1"/>
-          </p:cNvSpPr>
-          <p:nvPr>
-            <p:ph idx="1"/>
-          </p:nvPr>
-        </p:nvSpPr>
-        <p:spPr/>
-        <p:txBody>
-          <a:bodyPr/>
-          <a:lstStyle/>
-          <a:p>
-            <a:endParaRPr lang="en-US"/>
-          </a:p>
-        </p:txBody>
-      </p:sp>
+              <a:rPr lang="en-US"/>
+              <a:t>Exploring the data</a:t>
+            </a:r>
+            <a:endParaRPr lang="en-US" dirty="0"/>
+          </a:p>
+        </p:txBody>
+      </p:sp>
+      <p:grpSp>
+        <p:nvGrpSpPr>
+          <p:cNvPr id="7" name="Group 6">
+            <a:extLst>
+              <a:ext uri="{FF2B5EF4-FFF2-40B4-BE49-F238E27FC236}">
+                <a16:creationId xmlns:a16="http://schemas.microsoft.com/office/drawing/2014/main" id="{D59A329F-D812-D2CA-C126-0BF31776A657}"/>
+              </a:ext>
+            </a:extLst>
+          </p:cNvPr>
+          <p:cNvGrpSpPr/>
+          <p:nvPr/>
+        </p:nvGrpSpPr>
+        <p:grpSpPr>
+          <a:xfrm>
+            <a:off x="1838376" y="3842844"/>
+            <a:ext cx="7772400" cy="2690791"/>
+            <a:chOff x="1680721" y="1363717"/>
+            <a:chExt cx="7772400" cy="2690791"/>
+          </a:xfrm>
+        </p:grpSpPr>
+        <p:pic>
+          <p:nvPicPr>
+            <p:cNvPr id="5" name="Picture 4" descr="A table with text on it&#10;&#10;Description automatically generated">
+              <a:extLst>
+                <a:ext uri="{FF2B5EF4-FFF2-40B4-BE49-F238E27FC236}">
+                  <a16:creationId xmlns:a16="http://schemas.microsoft.com/office/drawing/2014/main" id="{43357CEB-D28A-A98E-8165-6C333652CB2D}"/>
+                </a:ext>
+              </a:extLst>
+            </p:cNvPr>
+            <p:cNvPicPr>
+              <a:picLocks noChangeAspect="1"/>
+            </p:cNvPicPr>
+            <p:nvPr/>
+          </p:nvPicPr>
+          <p:blipFill rotWithShape="1">
+            <a:blip r:embed="rId3"/>
+            <a:srcRect b="81074"/>
+            <a:stretch/>
+          </p:blipFill>
+          <p:spPr>
+            <a:xfrm>
+              <a:off x="1680721" y="1363717"/>
+              <a:ext cx="7772400" cy="843455"/>
+            </a:xfrm>
+            <a:prstGeom prst="rect">
+              <a:avLst/>
+            </a:prstGeom>
+          </p:spPr>
+        </p:pic>
+        <p:pic>
+          <p:nvPicPr>
+            <p:cNvPr id="6" name="Picture 5" descr="A table with text on it&#10;&#10;Description automatically generated">
+              <a:extLst>
+                <a:ext uri="{FF2B5EF4-FFF2-40B4-BE49-F238E27FC236}">
+                  <a16:creationId xmlns:a16="http://schemas.microsoft.com/office/drawing/2014/main" id="{7B8B6DD2-97A7-7411-9430-E1B3514E35D2}"/>
+                </a:ext>
+              </a:extLst>
+            </p:cNvPr>
+            <p:cNvPicPr>
+              <a:picLocks noChangeAspect="1"/>
+            </p:cNvPicPr>
+            <p:nvPr/>
+          </p:nvPicPr>
+          <p:blipFill rotWithShape="1">
+            <a:blip r:embed="rId3"/>
+            <a:srcRect t="58547"/>
+            <a:stretch/>
+          </p:blipFill>
+          <p:spPr>
+            <a:xfrm>
+              <a:off x="1680721" y="2207172"/>
+              <a:ext cx="7772400" cy="1847336"/>
+            </a:xfrm>
+            <a:prstGeom prst="rect">
+              <a:avLst/>
+            </a:prstGeom>
+          </p:spPr>
+        </p:pic>
+      </p:grpSp>
     </p:spTree>
     <p:extLst>
       <p:ext uri="{BB962C8B-B14F-4D97-AF65-F5344CB8AC3E}">
-        <p14:creationId xmlns:p14="http://schemas.microsoft.com/office/powerpoint/2010/main" val="2356807947"/>
+        <p14:creationId xmlns:p14="http://schemas.microsoft.com/office/powerpoint/2010/main" val="2061080694"/>
       </p:ext>
     </p:extLst>
   </p:cSld>
@@ -5177,7 +6036,7 @@
           <p:cNvPr id="2" name="Title 1">
             <a:extLst>
               <a:ext uri="{FF2B5EF4-FFF2-40B4-BE49-F238E27FC236}">
-                <a16:creationId xmlns:a16="http://schemas.microsoft.com/office/drawing/2014/main" id="{B7CFA0D9-8FA7-A2E9-6C74-6271BAAE8E2B}"/>
+                <a16:creationId xmlns:a16="http://schemas.microsoft.com/office/drawing/2014/main" id="{0F6CE28D-D77F-885B-91A5-7302FAE378C4}"/>
               </a:ext>
             </a:extLst>
           </p:cNvPr>
@@ -5195,7 +6054,7 @@
           <a:p>
             <a:r>
               <a:rPr lang="en-US" dirty="0"/>
-              <a:t>Results: Prediction</a:t>
+              <a:t>Methodology</a:t>
             </a:r>
           </a:p>
         </p:txBody>
@@ -5205,7 +6064,7 @@
           <p:cNvPr id="3" name="Content Placeholder 2">
             <a:extLst>
               <a:ext uri="{FF2B5EF4-FFF2-40B4-BE49-F238E27FC236}">
-                <a16:creationId xmlns:a16="http://schemas.microsoft.com/office/drawing/2014/main" id="{C0BAB623-DF89-7F64-925C-AAC7D0161319}"/>
+                <a16:creationId xmlns:a16="http://schemas.microsoft.com/office/drawing/2014/main" id="{88C63423-5311-72BE-AC08-8DDEB193F258}"/>
               </a:ext>
             </a:extLst>
           </p:cNvPr>
@@ -5228,7 +6087,7 @@
     </p:spTree>
     <p:extLst>
       <p:ext uri="{BB962C8B-B14F-4D97-AF65-F5344CB8AC3E}">
-        <p14:creationId xmlns:p14="http://schemas.microsoft.com/office/powerpoint/2010/main" val="3755429688"/>
+        <p14:creationId xmlns:p14="http://schemas.microsoft.com/office/powerpoint/2010/main" val="2356807947"/>
       </p:ext>
     </p:extLst>
   </p:cSld>
@@ -5260,7 +6119,7 @@
           <p:cNvPr id="2" name="Title 1">
             <a:extLst>
               <a:ext uri="{FF2B5EF4-FFF2-40B4-BE49-F238E27FC236}">
-                <a16:creationId xmlns:a16="http://schemas.microsoft.com/office/drawing/2014/main" id="{EF105882-36DC-D387-CA38-FF8841B6DF85}"/>
+                <a16:creationId xmlns:a16="http://schemas.microsoft.com/office/drawing/2014/main" id="{B7CFA0D9-8FA7-A2E9-6C74-6271BAAE8E2B}"/>
               </a:ext>
             </a:extLst>
           </p:cNvPr>
@@ -5278,7 +6137,7 @@
           <a:p>
             <a:r>
               <a:rPr lang="en-US" dirty="0"/>
-              <a:t>Results: Interpretation</a:t>
+              <a:t>Results: Prediction</a:t>
             </a:r>
           </a:p>
         </p:txBody>
@@ -5288,7 +6147,7 @@
           <p:cNvPr id="3" name="Content Placeholder 2">
             <a:extLst>
               <a:ext uri="{FF2B5EF4-FFF2-40B4-BE49-F238E27FC236}">
-                <a16:creationId xmlns:a16="http://schemas.microsoft.com/office/drawing/2014/main" id="{121302A5-C0D1-86C4-9AA4-66F33B64A5E0}"/>
+                <a16:creationId xmlns:a16="http://schemas.microsoft.com/office/drawing/2014/main" id="{C0BAB623-DF89-7F64-925C-AAC7D0161319}"/>
               </a:ext>
             </a:extLst>
           </p:cNvPr>
@@ -5311,7 +6170,7 @@
     </p:spTree>
     <p:extLst>
       <p:ext uri="{BB962C8B-B14F-4D97-AF65-F5344CB8AC3E}">
-        <p14:creationId xmlns:p14="http://schemas.microsoft.com/office/powerpoint/2010/main" val="1204778042"/>
+        <p14:creationId xmlns:p14="http://schemas.microsoft.com/office/powerpoint/2010/main" val="3755429688"/>
       </p:ext>
     </p:extLst>
   </p:cSld>
@@ -5343,6 +6202,89 @@
           <p:cNvPr id="2" name="Title 1">
             <a:extLst>
               <a:ext uri="{FF2B5EF4-FFF2-40B4-BE49-F238E27FC236}">
+                <a16:creationId xmlns:a16="http://schemas.microsoft.com/office/drawing/2014/main" id="{EF105882-36DC-D387-CA38-FF8841B6DF85}"/>
+              </a:ext>
+            </a:extLst>
+          </p:cNvPr>
+          <p:cNvSpPr>
+            <a:spLocks noGrp="1"/>
+          </p:cNvSpPr>
+          <p:nvPr>
+            <p:ph type="title"/>
+          </p:nvPr>
+        </p:nvSpPr>
+        <p:spPr/>
+        <p:txBody>
+          <a:bodyPr/>
+          <a:lstStyle/>
+          <a:p>
+            <a:r>
+              <a:rPr lang="en-US" dirty="0"/>
+              <a:t>Results: Interpretation</a:t>
+            </a:r>
+          </a:p>
+        </p:txBody>
+      </p:sp>
+      <p:sp>
+        <p:nvSpPr>
+          <p:cNvPr id="3" name="Content Placeholder 2">
+            <a:extLst>
+              <a:ext uri="{FF2B5EF4-FFF2-40B4-BE49-F238E27FC236}">
+                <a16:creationId xmlns:a16="http://schemas.microsoft.com/office/drawing/2014/main" id="{121302A5-C0D1-86C4-9AA4-66F33B64A5E0}"/>
+              </a:ext>
+            </a:extLst>
+          </p:cNvPr>
+          <p:cNvSpPr>
+            <a:spLocks noGrp="1"/>
+          </p:cNvSpPr>
+          <p:nvPr>
+            <p:ph idx="1"/>
+          </p:nvPr>
+        </p:nvSpPr>
+        <p:spPr/>
+        <p:txBody>
+          <a:bodyPr/>
+          <a:lstStyle/>
+          <a:p>
+            <a:endParaRPr lang="en-US"/>
+          </a:p>
+        </p:txBody>
+      </p:sp>
+    </p:spTree>
+    <p:extLst>
+      <p:ext uri="{BB962C8B-B14F-4D97-AF65-F5344CB8AC3E}">
+        <p14:creationId xmlns:p14="http://schemas.microsoft.com/office/powerpoint/2010/main" val="1204778042"/>
+      </p:ext>
+    </p:extLst>
+  </p:cSld>
+  <p:clrMapOvr>
+    <a:masterClrMapping/>
+  </p:clrMapOvr>
+</p:sld>
+</file>
+
+<file path=ppt/slides/slide8.xml><?xml version="1.0" encoding="utf-8"?>
+<p:sld xmlns:a="http://schemas.openxmlformats.org/drawingml/2006/main" xmlns:r="http://schemas.openxmlformats.org/officeDocument/2006/relationships" xmlns:p="http://schemas.openxmlformats.org/presentationml/2006/main">
+  <p:cSld>
+    <p:spTree>
+      <p:nvGrpSpPr>
+        <p:cNvPr id="1" name=""/>
+        <p:cNvGrpSpPr/>
+        <p:nvPr/>
+      </p:nvGrpSpPr>
+      <p:grpSpPr>
+        <a:xfrm>
+          <a:off x="0" y="0"/>
+          <a:ext cx="0" cy="0"/>
+          <a:chOff x="0" y="0"/>
+          <a:chExt cx="0" cy="0"/>
+        </a:xfrm>
+      </p:grpSpPr>
+      <p:sp>
+        <p:nvSpPr>
+          <p:cNvPr id="2" name="Title 1">
+            <a:extLst>
+              <a:ext uri="{FF2B5EF4-FFF2-40B4-BE49-F238E27FC236}">
                 <a16:creationId xmlns:a16="http://schemas.microsoft.com/office/drawing/2014/main" id="{6701D6D5-DD5A-43F1-AC14-453CAE214ABD}"/>
               </a:ext>
             </a:extLst>
@@ -5396,6 +6338,113 @@
     <p:extLst>
       <p:ext uri="{BB962C8B-B14F-4D97-AF65-F5344CB8AC3E}">
         <p14:creationId xmlns:p14="http://schemas.microsoft.com/office/powerpoint/2010/main" val="3858923319"/>
+      </p:ext>
+    </p:extLst>
+  </p:cSld>
+  <p:clrMapOvr>
+    <a:masterClrMapping/>
+  </p:clrMapOvr>
+</p:sld>
+</file>
+
+<file path=ppt/slides/slide9.xml><?xml version="1.0" encoding="utf-8"?>
+<p:sld xmlns:a="http://schemas.openxmlformats.org/drawingml/2006/main" xmlns:r="http://schemas.openxmlformats.org/officeDocument/2006/relationships" xmlns:p="http://schemas.openxmlformats.org/presentationml/2006/main">
+  <p:cSld>
+    <p:spTree>
+      <p:nvGrpSpPr>
+        <p:cNvPr id="1" name=""/>
+        <p:cNvGrpSpPr/>
+        <p:nvPr/>
+      </p:nvGrpSpPr>
+      <p:grpSpPr>
+        <a:xfrm>
+          <a:off x="0" y="0"/>
+          <a:ext cx="0" cy="0"/>
+          <a:chOff x="0" y="0"/>
+          <a:chExt cx="0" cy="0"/>
+        </a:xfrm>
+      </p:grpSpPr>
+      <p:pic>
+        <p:nvPicPr>
+          <p:cNvPr id="4" name="Picture 3" descr="Alert: Memes could have malware and take control of the device - Infobae">
+            <a:extLst>
+              <a:ext uri="{FF2B5EF4-FFF2-40B4-BE49-F238E27FC236}">
+                <a16:creationId xmlns:a16="http://schemas.microsoft.com/office/drawing/2014/main" id="{9F84D7FA-0A53-17A1-010C-7E0BE3BE4166}"/>
+              </a:ext>
+            </a:extLst>
+          </p:cNvPr>
+          <p:cNvPicPr>
+            <a:picLocks noChangeAspect="1" noChangeArrowheads="1"/>
+          </p:cNvPicPr>
+          <p:nvPr/>
+        </p:nvPicPr>
+        <p:blipFill>
+          <a:blip r:embed="rId2">
+            <a:extLst>
+              <a:ext uri="{28A0092B-C50C-407E-A947-70E740481C1C}">
+                <a14:useLocalDpi xmlns:a14="http://schemas.microsoft.com/office/drawing/2010/main" val="0"/>
+              </a:ext>
+            </a:extLst>
+          </a:blip>
+          <a:srcRect/>
+          <a:stretch>
+            <a:fillRect/>
+          </a:stretch>
+        </p:blipFill>
+        <p:spPr bwMode="auto">
+          <a:xfrm>
+            <a:off x="533473" y="3067623"/>
+            <a:ext cx="5082694" cy="2770068"/>
+          </a:xfrm>
+          <a:prstGeom prst="rect">
+            <a:avLst/>
+          </a:prstGeom>
+          <a:noFill/>
+          <a:extLst>
+            <a:ext uri="{909E8E84-426E-40DD-AFC4-6F175D3DCCD1}">
+              <a14:hiddenFill xmlns:a14="http://schemas.microsoft.com/office/drawing/2010/main">
+                <a:solidFill>
+                  <a:srgbClr val="FFFFFF"/>
+                </a:solidFill>
+              </a14:hiddenFill>
+            </a:ext>
+          </a:extLst>
+        </p:spPr>
+      </p:pic>
+      <p:pic>
+        <p:nvPicPr>
+          <p:cNvPr id="5" name="Picture 4">
+            <a:extLst>
+              <a:ext uri="{FF2B5EF4-FFF2-40B4-BE49-F238E27FC236}">
+                <a16:creationId xmlns:a16="http://schemas.microsoft.com/office/drawing/2014/main" id="{08A07069-5C98-61CD-2726-3FAE83F5684D}"/>
+              </a:ext>
+            </a:extLst>
+          </p:cNvPr>
+          <p:cNvPicPr>
+            <a:picLocks noChangeAspect="1"/>
+          </p:cNvPicPr>
+          <p:nvPr/>
+        </p:nvPicPr>
+        <p:blipFill>
+          <a:blip r:embed="rId3"/>
+          <a:stretch>
+            <a:fillRect/>
+          </a:stretch>
+        </p:blipFill>
+        <p:spPr>
+          <a:xfrm>
+            <a:off x="8239966" y="3846874"/>
+            <a:ext cx="2361594" cy="2833913"/>
+          </a:xfrm>
+          <a:prstGeom prst="rect">
+            <a:avLst/>
+          </a:prstGeom>
+        </p:spPr>
+      </p:pic>
+    </p:spTree>
+    <p:extLst>
+      <p:ext uri="{BB962C8B-B14F-4D97-AF65-F5344CB8AC3E}">
+        <p14:creationId xmlns:p14="http://schemas.microsoft.com/office/powerpoint/2010/main" val="4094484015"/>
       </p:ext>
     </p:extLst>
   </p:cSld>
@@ -5604,4 +6653,299 @@
     </a:ext>
   </a:extLst>
 </a:theme>
+</file>
+
+<file path=ppt/theme/theme2.xml><?xml version="1.0" encoding="utf-8"?>
+<a:theme xmlns:a="http://schemas.openxmlformats.org/drawingml/2006/main" name="Office Theme">
+  <a:themeElements>
+    <a:clrScheme name="Office">
+      <a:dk1>
+        <a:sysClr val="windowText" lastClr="000000"/>
+      </a:dk1>
+      <a:lt1>
+        <a:sysClr val="window" lastClr="FFFFFF"/>
+      </a:lt1>
+      <a:dk2>
+        <a:srgbClr val="44546A"/>
+      </a:dk2>
+      <a:lt2>
+        <a:srgbClr val="E7E6E6"/>
+      </a:lt2>
+      <a:accent1>
+        <a:srgbClr val="4472C4"/>
+      </a:accent1>
+      <a:accent2>
+        <a:srgbClr val="ED7D31"/>
+      </a:accent2>
+      <a:accent3>
+        <a:srgbClr val="A5A5A5"/>
+      </a:accent3>
+      <a:accent4>
+        <a:srgbClr val="FFC000"/>
+      </a:accent4>
+      <a:accent5>
+        <a:srgbClr val="5B9BD5"/>
+      </a:accent5>
+      <a:accent6>
+        <a:srgbClr val="70AD47"/>
+      </a:accent6>
+      <a:hlink>
+        <a:srgbClr val="0563C1"/>
+      </a:hlink>
+      <a:folHlink>
+        <a:srgbClr val="954F72"/>
+      </a:folHlink>
+    </a:clrScheme>
+    <a:fontScheme name="Office">
+      <a:majorFont>
+        <a:latin typeface="Calibri Light" panose="020F0302020204030204"/>
+        <a:ea typeface=""/>
+        <a:cs typeface=""/>
+        <a:font script="Jpan" typeface="游ゴシック Light"/>
+        <a:font script="Hang" typeface="맑은 고딕"/>
+        <a:font script="Hans" typeface="等线 Light"/>
+        <a:font script="Hant" typeface="新細明體"/>
+        <a:font script="Arab" typeface="Times New Roman"/>
+        <a:font script="Hebr" typeface="Times New Roman"/>
+        <a:font script="Thai" typeface="Angsana New"/>
+        <a:font script="Ethi" typeface="Nyala"/>
+        <a:font script="Beng" typeface="Vrinda"/>
+        <a:font script="Gujr" typeface="Shruti"/>
+        <a:font script="Khmr" typeface="MoolBoran"/>
+        <a:font script="Knda" typeface="Tunga"/>
+        <a:font script="Guru" typeface="Raavi"/>
+        <a:font script="Cans" typeface="Euphemia"/>
+        <a:font script="Cher" typeface="Plantagenet Cherokee"/>
+        <a:font script="Yiii" typeface="Microsoft Yi Baiti"/>
+        <a:font script="Tibt" typeface="Microsoft Himalaya"/>
+        <a:font script="Thaa" typeface="MV Boli"/>
+        <a:font script="Deva" typeface="Mangal"/>
+        <a:font script="Telu" typeface="Gautami"/>
+        <a:font script="Taml" typeface="Latha"/>
+        <a:font script="Syrc" typeface="Estrangelo Edessa"/>
+        <a:font script="Orya" typeface="Kalinga"/>
+        <a:font script="Mlym" typeface="Kartika"/>
+        <a:font script="Laoo" typeface="DokChampa"/>
+        <a:font script="Sinh" typeface="Iskoola Pota"/>
+        <a:font script="Mong" typeface="Mongolian Baiti"/>
+        <a:font script="Viet" typeface="Times New Roman"/>
+        <a:font script="Uigh" typeface="Microsoft Uighur"/>
+        <a:font script="Geor" typeface="Sylfaen"/>
+        <a:font script="Armn" typeface="Arial"/>
+        <a:font script="Bugi" typeface="Leelawadee UI"/>
+        <a:font script="Bopo" typeface="Microsoft JhengHei"/>
+        <a:font script="Java" typeface="Javanese Text"/>
+        <a:font script="Lisu" typeface="Segoe UI"/>
+        <a:font script="Mymr" typeface="Myanmar Text"/>
+        <a:font script="Nkoo" typeface="Ebrima"/>
+        <a:font script="Olck" typeface="Nirmala UI"/>
+        <a:font script="Osma" typeface="Ebrima"/>
+        <a:font script="Phag" typeface="Phagspa"/>
+        <a:font script="Syrn" typeface="Estrangelo Edessa"/>
+        <a:font script="Syrj" typeface="Estrangelo Edessa"/>
+        <a:font script="Syre" typeface="Estrangelo Edessa"/>
+        <a:font script="Sora" typeface="Nirmala UI"/>
+        <a:font script="Tale" typeface="Microsoft Tai Le"/>
+        <a:font script="Talu" typeface="Microsoft New Tai Lue"/>
+        <a:font script="Tfng" typeface="Ebrima"/>
+      </a:majorFont>
+      <a:minorFont>
+        <a:latin typeface="Calibri" panose="020F0502020204030204"/>
+        <a:ea typeface=""/>
+        <a:cs typeface=""/>
+        <a:font script="Jpan" typeface="游ゴシック"/>
+        <a:font script="Hang" typeface="맑은 고딕"/>
+        <a:font script="Hans" typeface="等线"/>
+        <a:font script="Hant" typeface="新細明體"/>
+        <a:font script="Arab" typeface="Arial"/>
+        <a:font script="Hebr" typeface="Arial"/>
+        <a:font script="Thai" typeface="Cordia New"/>
+        <a:font script="Ethi" typeface="Nyala"/>
+        <a:font script="Beng" typeface="Vrinda"/>
+        <a:font script="Gujr" typeface="Shruti"/>
+        <a:font script="Khmr" typeface="DaunPenh"/>
+        <a:font script="Knda" typeface="Tunga"/>
+        <a:font script="Guru" typeface="Raavi"/>
+        <a:font script="Cans" typeface="Euphemia"/>
+        <a:font script="Cher" typeface="Plantagenet Cherokee"/>
+        <a:font script="Yiii" typeface="Microsoft Yi Baiti"/>
+        <a:font script="Tibt" typeface="Microsoft Himalaya"/>
+        <a:font script="Thaa" typeface="MV Boli"/>
+        <a:font script="Deva" typeface="Mangal"/>
+        <a:font script="Telu" typeface="Gautami"/>
+        <a:font script="Taml" typeface="Latha"/>
+        <a:font script="Syrc" typeface="Estrangelo Edessa"/>
+        <a:font script="Orya" typeface="Kalinga"/>
+        <a:font script="Mlym" typeface="Kartika"/>
+        <a:font script="Laoo" typeface="DokChampa"/>
+        <a:font script="Sinh" typeface="Iskoola Pota"/>
+        <a:font script="Mong" typeface="Mongolian Baiti"/>
+        <a:font script="Viet" typeface="Arial"/>
+        <a:font script="Uigh" typeface="Microsoft Uighur"/>
+        <a:font script="Geor" typeface="Sylfaen"/>
+        <a:font script="Armn" typeface="Arial"/>
+        <a:font script="Bugi" typeface="Leelawadee UI"/>
+        <a:font script="Bopo" typeface="Microsoft JhengHei"/>
+        <a:font script="Java" typeface="Javanese Text"/>
+        <a:font script="Lisu" typeface="Segoe UI"/>
+        <a:font script="Mymr" typeface="Myanmar Text"/>
+        <a:font script="Nkoo" typeface="Ebrima"/>
+        <a:font script="Olck" typeface="Nirmala UI"/>
+        <a:font script="Osma" typeface="Ebrima"/>
+        <a:font script="Phag" typeface="Phagspa"/>
+        <a:font script="Syrn" typeface="Estrangelo Edessa"/>
+        <a:font script="Syrj" typeface="Estrangelo Edessa"/>
+        <a:font script="Syre" typeface="Estrangelo Edessa"/>
+        <a:font script="Sora" typeface="Nirmala UI"/>
+        <a:font script="Tale" typeface="Microsoft Tai Le"/>
+        <a:font script="Talu" typeface="Microsoft New Tai Lue"/>
+        <a:font script="Tfng" typeface="Ebrima"/>
+      </a:minorFont>
+    </a:fontScheme>
+    <a:fmtScheme name="Office">
+      <a:fillStyleLst>
+        <a:solidFill>
+          <a:schemeClr val="phClr"/>
+        </a:solidFill>
+        <a:gradFill rotWithShape="1">
+          <a:gsLst>
+            <a:gs pos="0">
+              <a:schemeClr val="phClr">
+                <a:lumMod val="110000"/>
+                <a:satMod val="105000"/>
+                <a:tint val="67000"/>
+              </a:schemeClr>
+            </a:gs>
+            <a:gs pos="50000">
+              <a:schemeClr val="phClr">
+                <a:lumMod val="105000"/>
+                <a:satMod val="103000"/>
+                <a:tint val="73000"/>
+              </a:schemeClr>
+            </a:gs>
+            <a:gs pos="100000">
+              <a:schemeClr val="phClr">
+                <a:lumMod val="105000"/>
+                <a:satMod val="109000"/>
+                <a:tint val="81000"/>
+              </a:schemeClr>
+            </a:gs>
+          </a:gsLst>
+          <a:lin ang="5400000" scaled="0"/>
+        </a:gradFill>
+        <a:gradFill rotWithShape="1">
+          <a:gsLst>
+            <a:gs pos="0">
+              <a:schemeClr val="phClr">
+                <a:satMod val="103000"/>
+                <a:lumMod val="102000"/>
+                <a:tint val="94000"/>
+              </a:schemeClr>
+            </a:gs>
+            <a:gs pos="50000">
+              <a:schemeClr val="phClr">
+                <a:satMod val="110000"/>
+                <a:lumMod val="100000"/>
+                <a:shade val="100000"/>
+              </a:schemeClr>
+            </a:gs>
+            <a:gs pos="100000">
+              <a:schemeClr val="phClr">
+                <a:lumMod val="99000"/>
+                <a:satMod val="120000"/>
+                <a:shade val="78000"/>
+              </a:schemeClr>
+            </a:gs>
+          </a:gsLst>
+          <a:lin ang="5400000" scaled="0"/>
+        </a:gradFill>
+      </a:fillStyleLst>
+      <a:lnStyleLst>
+        <a:ln w="6350" cap="flat" cmpd="sng" algn="ctr">
+          <a:solidFill>
+            <a:schemeClr val="phClr"/>
+          </a:solidFill>
+          <a:prstDash val="solid"/>
+          <a:miter lim="800000"/>
+        </a:ln>
+        <a:ln w="12700" cap="flat" cmpd="sng" algn="ctr">
+          <a:solidFill>
+            <a:schemeClr val="phClr"/>
+          </a:solidFill>
+          <a:prstDash val="solid"/>
+          <a:miter lim="800000"/>
+        </a:ln>
+        <a:ln w="19050" cap="flat" cmpd="sng" algn="ctr">
+          <a:solidFill>
+            <a:schemeClr val="phClr"/>
+          </a:solidFill>
+          <a:prstDash val="solid"/>
+          <a:miter lim="800000"/>
+        </a:ln>
+      </a:lnStyleLst>
+      <a:effectStyleLst>
+        <a:effectStyle>
+          <a:effectLst/>
+        </a:effectStyle>
+        <a:effectStyle>
+          <a:effectLst/>
+        </a:effectStyle>
+        <a:effectStyle>
+          <a:effectLst>
+            <a:outerShdw blurRad="57150" dist="19050" dir="5400000" algn="ctr" rotWithShape="0">
+              <a:srgbClr val="000000">
+                <a:alpha val="63000"/>
+              </a:srgbClr>
+            </a:outerShdw>
+          </a:effectLst>
+        </a:effectStyle>
+      </a:effectStyleLst>
+      <a:bgFillStyleLst>
+        <a:solidFill>
+          <a:schemeClr val="phClr"/>
+        </a:solidFill>
+        <a:solidFill>
+          <a:schemeClr val="phClr">
+            <a:tint val="95000"/>
+            <a:satMod val="170000"/>
+          </a:schemeClr>
+        </a:solidFill>
+        <a:gradFill rotWithShape="1">
+          <a:gsLst>
+            <a:gs pos="0">
+              <a:schemeClr val="phClr">
+                <a:tint val="93000"/>
+                <a:satMod val="150000"/>
+                <a:shade val="98000"/>
+                <a:lumMod val="102000"/>
+              </a:schemeClr>
+            </a:gs>
+            <a:gs pos="50000">
+              <a:schemeClr val="phClr">
+                <a:tint val="98000"/>
+                <a:satMod val="130000"/>
+                <a:shade val="90000"/>
+                <a:lumMod val="103000"/>
+              </a:schemeClr>
+            </a:gs>
+            <a:gs pos="100000">
+              <a:schemeClr val="phClr">
+                <a:shade val="63000"/>
+                <a:satMod val="120000"/>
+              </a:schemeClr>
+            </a:gs>
+          </a:gsLst>
+          <a:lin ang="5400000" scaled="0"/>
+        </a:gradFill>
+      </a:bgFillStyleLst>
+    </a:fmtScheme>
+  </a:themeElements>
+  <a:objectDefaults/>
+  <a:extraClrSchemeLst/>
+  <a:extLst>
+    <a:ext uri="{05A4C25C-085E-4340-85A3-A5531E510DB2}">
+      <thm15:themeFamily xmlns:thm15="http://schemas.microsoft.com/office/thememl/2012/main" name="Office Theme" id="{62F939B6-93AF-4DB8-9C6B-D6C7DFDC589F}" vid="{4A3C46E8-61CC-4603-A589-7422A47A8E4A}"/>
+    </a:ext>
+  </a:extLst>
+</a:theme>
 </file>
</xml_diff>